<commit_message>
slides14w some hiding, staff notes in CP_consecutive_coin_flips
</commit_message>
<xml_diff>
--- a/fall11/slidesF11/slides14w.pptx
+++ b/fall11/slidesF11/slides14w.pptx
@@ -8354,7 +8354,7 @@
           <a:graphicData uri="http://schemas.openxmlformats.org/presentationml/2006/ole">
             <mc:AlternateContent xmlns:mc="http://schemas.openxmlformats.org/markup-compatibility/2006">
               <mc:Choice xmlns:v="urn:schemas-microsoft-com:vml" Requires="v">
-                <p:oleObj spid="_x0000_s174093" name="Equation" r:id="rId4" imgW="2006280" imgH="812520" progId="Equation.DSMT4">
+                <p:oleObj spid="_x0000_s174095" name="Equation" r:id="rId4" imgW="2006280" imgH="812520" progId="Equation.DSMT4">
                   <p:embed/>
                 </p:oleObj>
               </mc:Choice>
@@ -8783,7 +8783,7 @@
           <a:graphicData uri="http://schemas.openxmlformats.org/presentationml/2006/ole">
             <mc:AlternateContent xmlns:mc="http://schemas.openxmlformats.org/markup-compatibility/2006">
               <mc:Choice xmlns:v="urn:schemas-microsoft-com:vml" Requires="v">
-                <p:oleObj spid="_x0000_s176141" name="Equation" r:id="rId4" imgW="2006280" imgH="812520" progId="Equation.DSMT4">
+                <p:oleObj spid="_x0000_s176143" name="Equation" r:id="rId4" imgW="2006280" imgH="812520" progId="Equation.DSMT4">
                   <p:embed/>
                 </p:oleObj>
               </mc:Choice>
@@ -10734,7 +10734,7 @@
           <a:graphicData uri="http://schemas.openxmlformats.org/presentationml/2006/ole">
             <mc:AlternateContent xmlns:mc="http://schemas.openxmlformats.org/markup-compatibility/2006">
               <mc:Choice xmlns:v="urn:schemas-microsoft-com:vml" Requires="v">
-                <p:oleObj spid="_x0000_s182286" name="Equation" r:id="rId4" imgW="419040" imgH="419040" progId="Equation.DSMT4">
+                <p:oleObj spid="_x0000_s182288" name="Equation" r:id="rId4" imgW="419040" imgH="419040" progId="Equation.DSMT4">
                   <p:embed/>
                 </p:oleObj>
               </mc:Choice>
@@ -11265,7 +11265,7 @@
           <a:graphicData uri="http://schemas.openxmlformats.org/presentationml/2006/ole">
             <mc:AlternateContent xmlns:mc="http://schemas.openxmlformats.org/markup-compatibility/2006">
               <mc:Choice xmlns:v="urn:schemas-microsoft-com:vml" Requires="v">
-                <p:oleObj spid="_x0000_s184334" name="Equation" r:id="rId4" imgW="1498600" imgH="431800" progId="Equation.DSMT4">
+                <p:oleObj spid="_x0000_s184336" name="Equation" r:id="rId4" imgW="1498600" imgH="431800" progId="Equation.DSMT4">
                   <p:embed/>
                 </p:oleObj>
               </mc:Choice>
@@ -11713,7 +11713,7 @@
           <a:graphicData uri="http://schemas.openxmlformats.org/presentationml/2006/ole">
             <mc:AlternateContent xmlns:mc="http://schemas.openxmlformats.org/markup-compatibility/2006">
               <mc:Choice xmlns:v="urn:schemas-microsoft-com:vml" Requires="v">
-                <p:oleObj spid="_x0000_s186381" name="Equation" r:id="rId4" imgW="1574800" imgH="419100" progId="Equation.DSMT4">
+                <p:oleObj spid="_x0000_s186383" name="Equation" r:id="rId4" imgW="1574800" imgH="419100" progId="Equation.DSMT4">
                   <p:embed/>
                 </p:oleObj>
               </mc:Choice>
@@ -11941,7 +11941,7 @@
           <a:graphicData uri="http://schemas.openxmlformats.org/presentationml/2006/ole">
             <mc:AlternateContent xmlns:mc="http://schemas.openxmlformats.org/markup-compatibility/2006">
               <mc:Choice xmlns:v="urn:schemas-microsoft-com:vml" Requires="v">
-                <p:oleObj spid="_x0000_s188450" name="Equation" r:id="rId4" imgW="1854200" imgH="431800" progId="Equation.DSMT4">
+                <p:oleObj spid="_x0000_s188455" name="Equation" r:id="rId4" imgW="1854200" imgH="431800" progId="Equation.DSMT4">
                   <p:embed/>
                 </p:oleObj>
               </mc:Choice>
@@ -12011,7 +12011,7 @@
           <a:graphicData uri="http://schemas.openxmlformats.org/presentationml/2006/ole">
             <mc:AlternateContent xmlns:mc="http://schemas.openxmlformats.org/markup-compatibility/2006">
               <mc:Choice xmlns:v="urn:schemas-microsoft-com:vml" Requires="v">
-                <p:oleObj spid="_x0000_s188451" name="Equation" r:id="rId6" imgW="1485900" imgH="431800" progId="Equation.DSMT4">
+                <p:oleObj spid="_x0000_s188456" name="Equation" r:id="rId6" imgW="1485900" imgH="431800" progId="Equation.DSMT4">
                   <p:embed/>
                 </p:oleObj>
               </mc:Choice>
@@ -12081,7 +12081,7 @@
           <a:graphicData uri="http://schemas.openxmlformats.org/presentationml/2006/ole">
             <mc:AlternateContent xmlns:mc="http://schemas.openxmlformats.org/markup-compatibility/2006">
               <mc:Choice xmlns:v="urn:schemas-microsoft-com:vml" Requires="v">
-                <p:oleObj spid="_x0000_s188452" name="Equation" r:id="rId8" imgW="1752600" imgH="546100" progId="Equation.DSMT4">
+                <p:oleObj spid="_x0000_s188457" name="Equation" r:id="rId8" imgW="1752600" imgH="546100" progId="Equation.DSMT4">
                   <p:embed/>
                 </p:oleObj>
               </mc:Choice>
@@ -12151,7 +12151,7 @@
           <a:graphicData uri="http://schemas.openxmlformats.org/presentationml/2006/ole">
             <mc:AlternateContent xmlns:mc="http://schemas.openxmlformats.org/markup-compatibility/2006">
               <mc:Choice xmlns:v="urn:schemas-microsoft-com:vml" Requires="v">
-                <p:oleObj spid="_x0000_s188453" name="Equation" r:id="rId10" imgW="1663700" imgH="431800" progId="Equation.DSMT4">
+                <p:oleObj spid="_x0000_s188458" name="Equation" r:id="rId10" imgW="1663700" imgH="431800" progId="Equation.DSMT4">
                   <p:embed/>
                 </p:oleObj>
               </mc:Choice>
@@ -12640,7 +12640,7 @@
           <a:graphicData uri="http://schemas.openxmlformats.org/presentationml/2006/ole">
             <mc:AlternateContent xmlns:mc="http://schemas.openxmlformats.org/markup-compatibility/2006">
               <mc:Choice xmlns:v="urn:schemas-microsoft-com:vml" Requires="v">
-                <p:oleObj spid="_x0000_s190477" name="Equation" r:id="rId4" imgW="914400" imgH="220320" progId="Equation.DSMT4">
+                <p:oleObj spid="_x0000_s190479" name="Equation" r:id="rId4" imgW="914400" imgH="220320" progId="Equation.DSMT4">
                   <p:embed/>
                 </p:oleObj>
               </mc:Choice>
@@ -13442,7 +13442,7 @@
           <a:graphicData uri="http://schemas.openxmlformats.org/presentationml/2006/ole">
             <mc:AlternateContent xmlns:mc="http://schemas.openxmlformats.org/markup-compatibility/2006">
               <mc:Choice xmlns:v="urn:schemas-microsoft-com:vml" Requires="v">
-                <p:oleObj spid="_x0000_s486422" name="Equation" r:id="rId4" imgW="2171700" imgH="533400" progId="Equation.DSMT4">
+                <p:oleObj spid="_x0000_s486425" name="Equation" r:id="rId4" imgW="2171700" imgH="533400" progId="Equation.DSMT4">
                   <p:embed/>
                 </p:oleObj>
               </mc:Choice>
@@ -13540,7 +13540,7 @@
           <a:graphicData uri="http://schemas.openxmlformats.org/presentationml/2006/ole">
             <mc:AlternateContent xmlns:mc="http://schemas.openxmlformats.org/markup-compatibility/2006">
               <mc:Choice xmlns:v="urn:schemas-microsoft-com:vml" Requires="v">
-                <p:oleObj spid="_x0000_s486423" name="Equation" r:id="rId6" imgW="1308100" imgH="342900" progId="Equation.DSMT4">
+                <p:oleObj spid="_x0000_s486426" name="Equation" r:id="rId6" imgW="1308100" imgH="342900" progId="Equation.DSMT4">
                   <p:embed/>
                 </p:oleObj>
               </mc:Choice>
@@ -14690,7 +14690,7 @@
           <a:graphicData uri="http://schemas.openxmlformats.org/presentationml/2006/ole">
             <mc:AlternateContent xmlns:mc="http://schemas.openxmlformats.org/markup-compatibility/2006">
               <mc:Choice xmlns:v="urn:schemas-microsoft-com:vml" Requires="v">
-                <p:oleObj spid="_x0000_s196628" name="Equation" r:id="rId4" imgW="1447800" imgH="533400" progId="Equation.DSMT4">
+                <p:oleObj spid="_x0000_s196631" name="Equation" r:id="rId4" imgW="1447800" imgH="533400" progId="Equation.DSMT4">
                   <p:embed/>
                 </p:oleObj>
               </mc:Choice>
@@ -14863,7 +14863,7 @@
           <a:graphicData uri="http://schemas.openxmlformats.org/presentationml/2006/ole">
             <mc:AlternateContent xmlns:mc="http://schemas.openxmlformats.org/markup-compatibility/2006">
               <mc:Choice xmlns:v="urn:schemas-microsoft-com:vml" Requires="v">
-                <p:oleObj spid="_x0000_s196629" name="Equation" r:id="rId6" imgW="1981200" imgH="495300" progId="Equation.DSMT4">
+                <p:oleObj spid="_x0000_s196632" name="Equation" r:id="rId6" imgW="1981200" imgH="495300" progId="Equation.DSMT4">
                   <p:embed/>
                 </p:oleObj>
               </mc:Choice>
@@ -15154,7 +15154,7 @@
           <a:graphicData uri="http://schemas.openxmlformats.org/presentationml/2006/ole">
             <mc:AlternateContent xmlns:mc="http://schemas.openxmlformats.org/markup-compatibility/2006">
               <mc:Choice xmlns:v="urn:schemas-microsoft-com:vml" Requires="v">
-                <p:oleObj spid="_x0000_s198676" name="Equation" r:id="rId4" imgW="1143000" imgH="533400" progId="Equation.DSMT4">
+                <p:oleObj spid="_x0000_s198679" name="Equation" r:id="rId4" imgW="1143000" imgH="533400" progId="Equation.DSMT4">
                   <p:embed/>
                 </p:oleObj>
               </mc:Choice>
@@ -15327,7 +15327,7 @@
           <a:graphicData uri="http://schemas.openxmlformats.org/presentationml/2006/ole">
             <mc:AlternateContent xmlns:mc="http://schemas.openxmlformats.org/markup-compatibility/2006">
               <mc:Choice xmlns:v="urn:schemas-microsoft-com:vml" Requires="v">
-                <p:oleObj spid="_x0000_s198677" name="Equation" r:id="rId6" imgW="1955520" imgH="444240" progId="Equation.DSMT4">
+                <p:oleObj spid="_x0000_s198680" name="Equation" r:id="rId6" imgW="1955520" imgH="444240" progId="Equation.DSMT4">
                   <p:embed/>
                 </p:oleObj>
               </mc:Choice>
@@ -15489,7 +15489,7 @@
           <a:graphicData uri="http://schemas.openxmlformats.org/presentationml/2006/ole">
             <mc:AlternateContent xmlns:mc="http://schemas.openxmlformats.org/markup-compatibility/2006">
               <mc:Choice xmlns:v="urn:schemas-microsoft-com:vml" Requires="v">
-                <p:oleObj spid="_x0000_s264205" name="Equation" r:id="rId4" imgW="1143000" imgH="533400" progId="Equation.DSMT4">
+                <p:oleObj spid="_x0000_s264207" name="Equation" r:id="rId4" imgW="1143000" imgH="533400" progId="Equation.DSMT4">
                   <p:embed/>
                 </p:oleObj>
               </mc:Choice>
@@ -15745,7 +15745,7 @@
           <a:graphicData uri="http://schemas.openxmlformats.org/presentationml/2006/ole">
             <mc:AlternateContent xmlns:mc="http://schemas.openxmlformats.org/markup-compatibility/2006">
               <mc:Choice xmlns:v="urn:schemas-microsoft-com:vml" Requires="v">
-                <p:oleObj spid="_x0000_s560148" name="Equation" r:id="rId4" imgW="1447800" imgH="533400" progId="Equation.DSMT4">
+                <p:oleObj spid="_x0000_s560151" name="Equation" r:id="rId4" imgW="1447800" imgH="533400" progId="Equation.DSMT4">
                   <p:embed/>
                 </p:oleObj>
               </mc:Choice>
@@ -15847,7 +15847,7 @@
           <a:graphicData uri="http://schemas.openxmlformats.org/presentationml/2006/ole">
             <mc:AlternateContent xmlns:mc="http://schemas.openxmlformats.org/markup-compatibility/2006">
               <mc:Choice xmlns:v="urn:schemas-microsoft-com:vml" Requires="v">
-                <p:oleObj spid="_x0000_s560149" name="Equation" r:id="rId6" imgW="1981200" imgH="495300" progId="Equation.DSMT4">
+                <p:oleObj spid="_x0000_s560152" name="Equation" r:id="rId6" imgW="1981200" imgH="495300" progId="Equation.DSMT4">
                   <p:embed/>
                 </p:oleObj>
               </mc:Choice>
@@ -16110,7 +16110,7 @@
           <a:graphicData uri="http://schemas.openxmlformats.org/presentationml/2006/ole">
             <mc:AlternateContent xmlns:mc="http://schemas.openxmlformats.org/markup-compatibility/2006">
               <mc:Choice xmlns:v="urn:schemas-microsoft-com:vml" Requires="v">
-                <p:oleObj spid="_x0000_s200731" name="Equation" r:id="rId4" imgW="1536480" imgH="507960" progId="Equation.DSMT4">
+                <p:oleObj spid="_x0000_s200735" name="Equation" r:id="rId4" imgW="1536480" imgH="507960" progId="Equation.DSMT4">
                   <p:embed/>
                 </p:oleObj>
               </mc:Choice>
@@ -16180,7 +16180,7 @@
           <a:graphicData uri="http://schemas.openxmlformats.org/presentationml/2006/ole">
             <mc:AlternateContent xmlns:mc="http://schemas.openxmlformats.org/markup-compatibility/2006">
               <mc:Choice xmlns:v="urn:schemas-microsoft-com:vml" Requires="v">
-                <p:oleObj spid="_x0000_s200732" name="Equation" r:id="rId6" imgW="1955520" imgH="507960" progId="Equation.DSMT4">
+                <p:oleObj spid="_x0000_s200736" name="Equation" r:id="rId6" imgW="1955520" imgH="507960" progId="Equation.DSMT4">
                   <p:embed/>
                 </p:oleObj>
               </mc:Choice>
@@ -16250,7 +16250,7 @@
           <a:graphicData uri="http://schemas.openxmlformats.org/presentationml/2006/ole">
             <mc:AlternateContent xmlns:mc="http://schemas.openxmlformats.org/markup-compatibility/2006">
               <mc:Choice xmlns:v="urn:schemas-microsoft-com:vml" Requires="v">
-                <p:oleObj spid="_x0000_s200733" name="Equation" r:id="rId8" imgW="863280" imgH="228600" progId="Equation.DSMT4">
+                <p:oleObj spid="_x0000_s200737" name="Equation" r:id="rId8" imgW="863280" imgH="228600" progId="Equation.DSMT4">
                   <p:embed/>
                 </p:oleObj>
               </mc:Choice>
@@ -16533,7 +16533,7 @@
           <a:graphicData uri="http://schemas.openxmlformats.org/presentationml/2006/ole">
             <mc:AlternateContent xmlns:mc="http://schemas.openxmlformats.org/markup-compatibility/2006">
               <mc:Choice xmlns:v="urn:schemas-microsoft-com:vml" Requires="v">
-                <p:oleObj spid="_x0000_s202772" name="Equation" r:id="rId4" imgW="1739880" imgH="507960" progId="Equation.DSMT4">
+                <p:oleObj spid="_x0000_s202775" name="Equation" r:id="rId4" imgW="1739880" imgH="507960" progId="Equation.DSMT4">
                   <p:embed/>
                 </p:oleObj>
               </mc:Choice>
@@ -16630,7 +16630,7 @@
           <a:graphicData uri="http://schemas.openxmlformats.org/presentationml/2006/ole">
             <mc:AlternateContent xmlns:mc="http://schemas.openxmlformats.org/markup-compatibility/2006">
               <mc:Choice xmlns:v="urn:schemas-microsoft-com:vml" Requires="v">
-                <p:oleObj spid="_x0000_s202773" name="Equation" r:id="rId6" imgW="1955520" imgH="507960" progId="Equation.DSMT4">
+                <p:oleObj spid="_x0000_s202776" name="Equation" r:id="rId6" imgW="1955520" imgH="507960" progId="Equation.DSMT4">
                   <p:embed/>
                 </p:oleObj>
               </mc:Choice>
@@ -16868,7 +16868,7 @@
           <a:graphicData uri="http://schemas.openxmlformats.org/presentationml/2006/ole">
             <mc:AlternateContent xmlns:mc="http://schemas.openxmlformats.org/markup-compatibility/2006">
               <mc:Choice xmlns:v="urn:schemas-microsoft-com:vml" Requires="v">
-                <p:oleObj spid="_x0000_s399380" name="Equation" r:id="rId4" imgW="1739880" imgH="507960" progId="Equation.DSMT4">
+                <p:oleObj spid="_x0000_s399383" name="Equation" r:id="rId4" imgW="1739880" imgH="507960" progId="Equation.DSMT4">
                   <p:embed/>
                 </p:oleObj>
               </mc:Choice>
@@ -16965,7 +16965,7 @@
           <a:graphicData uri="http://schemas.openxmlformats.org/presentationml/2006/ole">
             <mc:AlternateContent xmlns:mc="http://schemas.openxmlformats.org/markup-compatibility/2006">
               <mc:Choice xmlns:v="urn:schemas-microsoft-com:vml" Requires="v">
-                <p:oleObj spid="_x0000_s399381" name="Equation" r:id="rId6" imgW="1879600" imgH="533400" progId="Equation.DSMT4">
+                <p:oleObj spid="_x0000_s399384" name="Equation" r:id="rId6" imgW="1879600" imgH="533400" progId="Equation.DSMT4">
                   <p:embed/>
                 </p:oleObj>
               </mc:Choice>
@@ -17687,7 +17687,7 @@
           <a:graphicData uri="http://schemas.openxmlformats.org/presentationml/2006/ole">
             <mc:AlternateContent xmlns:mc="http://schemas.openxmlformats.org/markup-compatibility/2006">
               <mc:Choice xmlns:v="urn:schemas-microsoft-com:vml" Requires="v">
-                <p:oleObj spid="_x0000_s206882" name="Equation" r:id="rId4" imgW="2260440" imgH="507960" progId="Equation.DSMT4">
+                <p:oleObj spid="_x0000_s206887" name="Equation" r:id="rId4" imgW="2260440" imgH="507960" progId="Equation.DSMT4">
                   <p:embed/>
                 </p:oleObj>
               </mc:Choice>
@@ -17753,7 +17753,7 @@
           <a:graphicData uri="http://schemas.openxmlformats.org/presentationml/2006/ole">
             <mc:AlternateContent xmlns:mc="http://schemas.openxmlformats.org/markup-compatibility/2006">
               <mc:Choice xmlns:v="urn:schemas-microsoft-com:vml" Requires="v">
-                <p:oleObj spid="_x0000_s206883" name="Equation" r:id="rId6" imgW="2184400" imgH="508000" progId="Equation.DSMT4">
+                <p:oleObj spid="_x0000_s206888" name="Equation" r:id="rId6" imgW="2184400" imgH="508000" progId="Equation.DSMT4">
                   <p:embed/>
                 </p:oleObj>
               </mc:Choice>
@@ -17814,7 +17814,7 @@
           <a:graphicData uri="http://schemas.openxmlformats.org/presentationml/2006/ole">
             <mc:AlternateContent xmlns:mc="http://schemas.openxmlformats.org/markup-compatibility/2006">
               <mc:Choice xmlns:v="urn:schemas-microsoft-com:vml" Requires="v">
-                <p:oleObj spid="_x0000_s206884" name="Equation" r:id="rId8" imgW="1739880" imgH="507960" progId="Equation.DSMT4">
+                <p:oleObj spid="_x0000_s206889" name="Equation" r:id="rId8" imgW="1739880" imgH="507960" progId="Equation.DSMT4">
                   <p:embed/>
                 </p:oleObj>
               </mc:Choice>
@@ -17973,7 +17973,7 @@
           <a:graphicData uri="http://schemas.openxmlformats.org/presentationml/2006/ole">
             <mc:AlternateContent xmlns:mc="http://schemas.openxmlformats.org/markup-compatibility/2006">
               <mc:Choice xmlns:v="urn:schemas-microsoft-com:vml" Requires="v">
-                <p:oleObj spid="_x0000_s206885" name="Equation" r:id="rId10" imgW="1180800" imgH="304560" progId="Equation.DSMT4">
+                <p:oleObj spid="_x0000_s206890" name="Equation" r:id="rId10" imgW="1180800" imgH="304560" progId="Equation.DSMT4">
                   <p:embed/>
                 </p:oleObj>
               </mc:Choice>
@@ -18273,7 +18273,7 @@
           <a:graphicData uri="http://schemas.openxmlformats.org/presentationml/2006/ole">
             <mc:AlternateContent xmlns:mc="http://schemas.openxmlformats.org/markup-compatibility/2006">
               <mc:Choice xmlns:v="urn:schemas-microsoft-com:vml" Requires="v">
-                <p:oleObj spid="_x0000_s210968" name="Equation" r:id="rId4" imgW="1676400" imgH="495300" progId="Equation.DSMT4">
+                <p:oleObj spid="_x0000_s210971" name="Equation" r:id="rId4" imgW="1676400" imgH="495300" progId="Equation.DSMT4">
                   <p:embed/>
                 </p:oleObj>
               </mc:Choice>
@@ -18349,7 +18349,7 @@
           <a:graphicData uri="http://schemas.openxmlformats.org/presentationml/2006/ole">
             <mc:AlternateContent xmlns:mc="http://schemas.openxmlformats.org/markup-compatibility/2006">
               <mc:Choice xmlns:v="urn:schemas-microsoft-com:vml" Requires="v">
-                <p:oleObj spid="_x0000_s210969" name="Equation" r:id="rId6" imgW="2019240" imgH="342720" progId="Equation.DSMT4">
+                <p:oleObj spid="_x0000_s210972" name="Equation" r:id="rId6" imgW="2019240" imgH="342720" progId="Equation.DSMT4">
                   <p:embed/>
                 </p:oleObj>
               </mc:Choice>
@@ -19152,7 +19152,7 @@
           <a:graphicData uri="http://schemas.openxmlformats.org/presentationml/2006/ole">
             <mc:AlternateContent xmlns:mc="http://schemas.openxmlformats.org/markup-compatibility/2006">
               <mc:Choice xmlns:v="urn:schemas-microsoft-com:vml" Requires="v">
-                <p:oleObj spid="_x0000_s213007" name="Equation" r:id="rId4" imgW="914400" imgH="220320" progId="Equation.DSMT4">
+                <p:oleObj spid="_x0000_s213009" name="Equation" r:id="rId4" imgW="914400" imgH="220320" progId="Equation.DSMT4">
                   <p:embed/>
                 </p:oleObj>
               </mc:Choice>
@@ -20058,7 +20058,7 @@
           <a:graphicData uri="http://schemas.openxmlformats.org/presentationml/2006/ole">
             <mc:AlternateContent xmlns:mc="http://schemas.openxmlformats.org/markup-compatibility/2006">
               <mc:Choice xmlns:v="urn:schemas-microsoft-com:vml" Requires="v">
-                <p:oleObj spid="_x0000_s1046" name="Equation" r:id="rId4" imgW="914400" imgH="220320" progId="Equation.DSMT4">
+                <p:oleObj spid="_x0000_s1049" name="Equation" r:id="rId4" imgW="914400" imgH="220320" progId="Equation.DSMT4">
                   <p:embed/>
                 </p:oleObj>
               </mc:Choice>
@@ -20128,7 +20128,7 @@
           <a:graphicData uri="http://schemas.openxmlformats.org/presentationml/2006/ole">
             <mc:AlternateContent xmlns:mc="http://schemas.openxmlformats.org/markup-compatibility/2006">
               <mc:Choice xmlns:v="urn:schemas-microsoft-com:vml" Requires="v">
-                <p:oleObj spid="_x0000_s1047" name="Equation" r:id="rId6" imgW="634680" imgH="304560" progId="Equation.DSMT4">
+                <p:oleObj spid="_x0000_s1050" name="Equation" r:id="rId6" imgW="634680" imgH="304560" progId="Equation.DSMT4">
                   <p:embed/>
                 </p:oleObj>
               </mc:Choice>
@@ -22580,7 +22580,7 @@
           <a:graphicData uri="http://schemas.openxmlformats.org/presentationml/2006/ole">
             <mc:AlternateContent xmlns:mc="http://schemas.openxmlformats.org/markup-compatibility/2006">
               <mc:Choice xmlns:v="urn:schemas-microsoft-com:vml" Requires="v">
-                <p:oleObj spid="_x0000_s562181" name="Equation" r:id="rId4" imgW="152400" imgH="508000" progId="Equation.DSMT4">
+                <p:oleObj spid="_x0000_s562183" name="Equation" r:id="rId4" imgW="152400" imgH="508000" progId="Equation.DSMT4">
                   <p:embed/>
                 </p:oleObj>
               </mc:Choice>
@@ -23332,7 +23332,7 @@
           <a:graphicData uri="http://schemas.openxmlformats.org/presentationml/2006/ole">
             <mc:AlternateContent xmlns:mc="http://schemas.openxmlformats.org/markup-compatibility/2006">
               <mc:Choice xmlns:v="urn:schemas-microsoft-com:vml" Requires="v">
-                <p:oleObj spid="_x0000_s219152" name="Equation" r:id="rId4" imgW="177800" imgH="165100" progId="Equation.DSMT4">
+                <p:oleObj spid="_x0000_s219154" name="Equation" r:id="rId4" imgW="177800" imgH="165100" progId="Equation.DSMT4">
                   <p:embed/>
                 </p:oleObj>
               </mc:Choice>
@@ -24516,7 +24516,7 @@
           <a:graphicData uri="http://schemas.openxmlformats.org/presentationml/2006/ole">
             <mc:AlternateContent xmlns:mc="http://schemas.openxmlformats.org/markup-compatibility/2006">
               <mc:Choice xmlns:v="urn:schemas-microsoft-com:vml" Requires="v">
-                <p:oleObj spid="_x0000_s221197" name="Equation" r:id="rId4" imgW="914400" imgH="220320" progId="Equation.DSMT4">
+                <p:oleObj spid="_x0000_s221199" name="Equation" r:id="rId4" imgW="914400" imgH="220320" progId="Equation.DSMT4">
                   <p:embed/>
                 </p:oleObj>
               </mc:Choice>
@@ -25547,7 +25547,7 @@
           <a:graphicData uri="http://schemas.openxmlformats.org/presentationml/2006/ole">
             <mc:AlternateContent xmlns:mc="http://schemas.openxmlformats.org/markup-compatibility/2006">
               <mc:Choice xmlns:v="urn:schemas-microsoft-com:vml" Requires="v">
-                <p:oleObj spid="_x0000_s223245" name="Equation" r:id="rId4" imgW="914400" imgH="220320" progId="Equation.DSMT4">
+                <p:oleObj spid="_x0000_s223247" name="Equation" r:id="rId4" imgW="914400" imgH="220320" progId="Equation.DSMT4">
                   <p:embed/>
                 </p:oleObj>
               </mc:Choice>
@@ -27215,7 +27215,7 @@
           <a:graphicData uri="http://schemas.openxmlformats.org/presentationml/2006/ole">
             <mc:AlternateContent xmlns:mc="http://schemas.openxmlformats.org/markup-compatibility/2006">
               <mc:Choice xmlns:v="urn:schemas-microsoft-com:vml" Requires="v">
-                <p:oleObj spid="_x0000_s225293" name="Equation" r:id="rId4" imgW="914400" imgH="220320" progId="Equation.DSMT4">
+                <p:oleObj spid="_x0000_s225295" name="Equation" r:id="rId4" imgW="914400" imgH="220320" progId="Equation.DSMT4">
                   <p:embed/>
                 </p:oleObj>
               </mc:Choice>
@@ -27604,7 +27604,7 @@
           <a:graphicData uri="http://schemas.openxmlformats.org/presentationml/2006/ole">
             <mc:AlternateContent xmlns:mc="http://schemas.openxmlformats.org/markup-compatibility/2006">
               <mc:Choice xmlns:v="urn:schemas-microsoft-com:vml" Requires="v">
-                <p:oleObj spid="_x0000_s227341" name="Equation" r:id="rId4" imgW="279360" imgH="457200" progId="Equation.DSMT4">
+                <p:oleObj spid="_x0000_s227343" name="Equation" r:id="rId4" imgW="279360" imgH="457200" progId="Equation.DSMT4">
                   <p:embed/>
                 </p:oleObj>
               </mc:Choice>
@@ -29412,7 +29412,7 @@
           <a:graphicData uri="http://schemas.openxmlformats.org/presentationml/2006/ole">
             <mc:AlternateContent xmlns:mc="http://schemas.openxmlformats.org/markup-compatibility/2006">
               <mc:Choice xmlns:v="urn:schemas-microsoft-com:vml" Requires="v">
-                <p:oleObj spid="_x0000_s231437" name="Equation" r:id="rId4" imgW="2222280" imgH="457200" progId="Equation.DSMT4">
+                <p:oleObj spid="_x0000_s231439" name="Equation" r:id="rId4" imgW="2222280" imgH="457200" progId="Equation.DSMT4">
                   <p:embed/>
                 </p:oleObj>
               </mc:Choice>
@@ -31642,7 +31642,7 @@
           <a:graphicData uri="http://schemas.openxmlformats.org/presentationml/2006/ole">
             <mc:AlternateContent xmlns:mc="http://schemas.openxmlformats.org/markup-compatibility/2006">
               <mc:Choice xmlns:v="urn:schemas-microsoft-com:vml" Requires="v">
-                <p:oleObj spid="_x0000_s239629" name="Equation" r:id="rId4" imgW="1701800" imgH="304800" progId="Equation.DSMT4">
+                <p:oleObj spid="_x0000_s239631" name="Equation" r:id="rId4" imgW="1701800" imgH="304800" progId="Equation.DSMT4">
                   <p:embed/>
                 </p:oleObj>
               </mc:Choice>
@@ -32121,7 +32121,7 @@
           <a:graphicData uri="http://schemas.openxmlformats.org/presentationml/2006/ole">
             <mc:AlternateContent xmlns:mc="http://schemas.openxmlformats.org/markup-compatibility/2006">
               <mc:Choice xmlns:v="urn:schemas-microsoft-com:vml" Requires="v">
-                <p:oleObj spid="_x0000_s241688" name="Equation" r:id="rId4" imgW="2159000" imgH="330200" progId="Equation.DSMT4">
+                <p:oleObj spid="_x0000_s241691" name="Equation" r:id="rId4" imgW="2159000" imgH="330200" progId="Equation.DSMT4">
                   <p:embed/>
                 </p:oleObj>
               </mc:Choice>
@@ -32223,7 +32223,7 @@
           <a:graphicData uri="http://schemas.openxmlformats.org/presentationml/2006/ole">
             <mc:AlternateContent xmlns:mc="http://schemas.openxmlformats.org/markup-compatibility/2006">
               <mc:Choice xmlns:v="urn:schemas-microsoft-com:vml" Requires="v">
-                <p:oleObj spid="_x0000_s241689" name="Equation" r:id="rId6" imgW="1968500" imgH="635000" progId="Equation.DSMT4">
+                <p:oleObj spid="_x0000_s241692" name="Equation" r:id="rId6" imgW="1968500" imgH="635000" progId="Equation.DSMT4">
                   <p:embed/>
                 </p:oleObj>
               </mc:Choice>
@@ -32779,7 +32779,7 @@
 </file>
 
 <file path=ppt/slides/slide49.xml><?xml version="1.0" encoding="utf-8"?>
-<p:sld xmlns:a="http://schemas.openxmlformats.org/drawingml/2006/main" xmlns:r="http://schemas.openxmlformats.org/officeDocument/2006/relationships" xmlns:p="http://schemas.openxmlformats.org/presentationml/2006/main">
+<p:sld xmlns:a="http://schemas.openxmlformats.org/drawingml/2006/main" xmlns:r="http://schemas.openxmlformats.org/officeDocument/2006/relationships" xmlns:p="http://schemas.openxmlformats.org/presentationml/2006/main" show="0">
   <p:cSld>
     <p:spTree>
       <p:nvGrpSpPr>
@@ -33753,7 +33753,7 @@
 </file>
 
 <file path=ppt/slides/slide50.xml><?xml version="1.0" encoding="utf-8"?>
-<p:sld xmlns:a="http://schemas.openxmlformats.org/drawingml/2006/main" xmlns:r="http://schemas.openxmlformats.org/officeDocument/2006/relationships" xmlns:p="http://schemas.openxmlformats.org/presentationml/2006/main">
+<p:sld xmlns:a="http://schemas.openxmlformats.org/drawingml/2006/main" xmlns:r="http://schemas.openxmlformats.org/officeDocument/2006/relationships" xmlns:p="http://schemas.openxmlformats.org/presentationml/2006/main" show="0">
   <p:cSld>
     <p:spTree>
       <p:nvGrpSpPr>
@@ -34179,7 +34179,7 @@
 </file>
 
 <file path=ppt/slides/slide51.xml><?xml version="1.0" encoding="utf-8"?>
-<p:sld xmlns:a="http://schemas.openxmlformats.org/drawingml/2006/main" xmlns:r="http://schemas.openxmlformats.org/officeDocument/2006/relationships" xmlns:p="http://schemas.openxmlformats.org/presentationml/2006/main">
+<p:sld xmlns:a="http://schemas.openxmlformats.org/drawingml/2006/main" xmlns:r="http://schemas.openxmlformats.org/officeDocument/2006/relationships" xmlns:p="http://schemas.openxmlformats.org/presentationml/2006/main" show="0">
   <p:cSld>
     <p:spTree>
       <p:nvGrpSpPr>
@@ -34996,7 +34996,7 @@
 </file>
 
 <file path=ppt/slides/slide52.xml><?xml version="1.0" encoding="utf-8"?>
-<p:sld xmlns:a="http://schemas.openxmlformats.org/drawingml/2006/main" xmlns:r="http://schemas.openxmlformats.org/officeDocument/2006/relationships" xmlns:p="http://schemas.openxmlformats.org/presentationml/2006/main" show="0">
+<p:sld xmlns:a="http://schemas.openxmlformats.org/drawingml/2006/main" xmlns:r="http://schemas.openxmlformats.org/officeDocument/2006/relationships" xmlns:p="http://schemas.openxmlformats.org/presentationml/2006/main">
   <p:cSld>
     <p:spTree>
       <p:nvGrpSpPr>
@@ -35478,7 +35478,7 @@
 </file>
 
 <file path=ppt/slides/slide53.xml><?xml version="1.0" encoding="utf-8"?>
-<p:sld xmlns:a="http://schemas.openxmlformats.org/drawingml/2006/main" xmlns:r="http://schemas.openxmlformats.org/officeDocument/2006/relationships" xmlns:p="http://schemas.openxmlformats.org/presentationml/2006/main" show="0">
+<p:sld xmlns:a="http://schemas.openxmlformats.org/drawingml/2006/main" xmlns:r="http://schemas.openxmlformats.org/officeDocument/2006/relationships" xmlns:p="http://schemas.openxmlformats.org/presentationml/2006/main">
   <p:cSld>
     <p:spTree>
       <p:nvGrpSpPr>
@@ -36127,7 +36127,7 @@
 </file>
 
 <file path=ppt/slides/slide54.xml><?xml version="1.0" encoding="utf-8"?>
-<p:sld xmlns:a="http://schemas.openxmlformats.org/drawingml/2006/main" xmlns:r="http://schemas.openxmlformats.org/officeDocument/2006/relationships" xmlns:p="http://schemas.openxmlformats.org/presentationml/2006/main" show="0">
+<p:sld xmlns:a="http://schemas.openxmlformats.org/drawingml/2006/main" xmlns:r="http://schemas.openxmlformats.org/officeDocument/2006/relationships" xmlns:p="http://schemas.openxmlformats.org/presentationml/2006/main">
   <p:cSld>
     <p:spTree>
       <p:nvGrpSpPr>
@@ -36823,7 +36823,7 @@
 </file>
 
 <file path=ppt/slides/slide55.xml><?xml version="1.0" encoding="utf-8"?>
-<p:sld xmlns:a="http://schemas.openxmlformats.org/drawingml/2006/main" xmlns:r="http://schemas.openxmlformats.org/officeDocument/2006/relationships" xmlns:p="http://schemas.openxmlformats.org/presentationml/2006/main" show="0">
+<p:sld xmlns:a="http://schemas.openxmlformats.org/drawingml/2006/main" xmlns:r="http://schemas.openxmlformats.org/officeDocument/2006/relationships" xmlns:p="http://schemas.openxmlformats.org/presentationml/2006/main">
   <p:cSld>
     <p:spTree>
       <p:nvGrpSpPr>
@@ -40386,7 +40386,7 @@
           <a:graphicData uri="http://schemas.openxmlformats.org/presentationml/2006/ole">
             <mc:AlternateContent xmlns:mc="http://schemas.openxmlformats.org/markup-compatibility/2006">
               <mc:Choice xmlns:v="urn:schemas-microsoft-com:vml" Requires="v">
-                <p:oleObj spid="_x0000_s167970" name="Equation" r:id="rId4" imgW="1270000" imgH="596900" progId="Equation.DSMT4">
+                <p:oleObj spid="_x0000_s167975" name="Equation" r:id="rId4" imgW="1270000" imgH="596900" progId="Equation.DSMT4">
                   <p:embed/>
                 </p:oleObj>
               </mc:Choice>
@@ -40456,7 +40456,7 @@
           <a:graphicData uri="http://schemas.openxmlformats.org/presentationml/2006/ole">
             <mc:AlternateContent xmlns:mc="http://schemas.openxmlformats.org/markup-compatibility/2006">
               <mc:Choice xmlns:v="urn:schemas-microsoft-com:vml" Requires="v">
-                <p:oleObj spid="_x0000_s167971" name="Equation" r:id="rId6" imgW="1600200" imgH="596900" progId="Equation.DSMT4">
+                <p:oleObj spid="_x0000_s167976" name="Equation" r:id="rId6" imgW="1600200" imgH="596900" progId="Equation.DSMT4">
                   <p:embed/>
                 </p:oleObj>
               </mc:Choice>
@@ -40526,7 +40526,7 @@
           <a:graphicData uri="http://schemas.openxmlformats.org/presentationml/2006/ole">
             <mc:AlternateContent xmlns:mc="http://schemas.openxmlformats.org/markup-compatibility/2006">
               <mc:Choice xmlns:v="urn:schemas-microsoft-com:vml" Requires="v">
-                <p:oleObj spid="_x0000_s167972" name="Equation" r:id="rId8" imgW="1727200" imgH="596900" progId="Equation.DSMT4">
+                <p:oleObj spid="_x0000_s167977" name="Equation" r:id="rId8" imgW="1727200" imgH="596900" progId="Equation.DSMT4">
                   <p:embed/>
                 </p:oleObj>
               </mc:Choice>
@@ -40596,7 +40596,7 @@
           <a:graphicData uri="http://schemas.openxmlformats.org/presentationml/2006/ole">
             <mc:AlternateContent xmlns:mc="http://schemas.openxmlformats.org/markup-compatibility/2006">
               <mc:Choice xmlns:v="urn:schemas-microsoft-com:vml" Requires="v">
-                <p:oleObj spid="_x0000_s167973" name="Equation" r:id="rId10" imgW="1257300" imgH="596900" progId="Equation.DSMT4">
+                <p:oleObj spid="_x0000_s167978" name="Equation" r:id="rId10" imgW="1257300" imgH="596900" progId="Equation.DSMT4">
                   <p:embed/>
                 </p:oleObj>
               </mc:Choice>

</xml_diff>